<commit_message>
updated City-Bikes-Analytics.pptx City-Bikes-Analytics.twb README.md
</commit_message>
<xml_diff>
--- a/City-Bikes-Analytics.pptx
+++ b/City-Bikes-Analytics.pptx
@@ -20,6 +20,10 @@
     <p:sldId id="268" r:id="rId18"/>
     <p:sldId id="269" r:id="rId19"/>
     <p:sldId id="270" r:id="rId20"/>
+    <p:sldId id="271" r:id="rId21"/>
+    <p:sldId id="272" r:id="rId22"/>
+    <p:sldId id="273" r:id="rId23"/>
+    <p:sldId id="274" r:id="rId24"/>
   </p:sldIdLst>
   <p:sldSz cx="12192000" cy="6858000"/>
   <p:notesSz cx="6858000" cy="9144000"/>
@@ -3340,7 +3344,7 @@
           <p:cNvPr id="0" name="slide1">
             <a:extLst>
               <a:ext uri="{FF2B5EF4-FFF2-40B4-BE49-F238E27FC236}">
-                <a16:creationId xmlns:a16="http://schemas.microsoft.com/office/drawing/2014/main" id="{FB302AD5-A72E-480E-823E-B2833814CB75}"/>
+                <a16:creationId xmlns:a16="http://schemas.microsoft.com/office/drawing/2014/main" id="{B8DB965A-2271-4549-8BC0-7C348628631F}"/>
               </a:ext>
             </a:extLst>
           </p:cNvPr>
@@ -3368,7 +3372,7 @@
           <p:cNvPr id="1" name="slide1">
             <a:extLst>
               <a:ext uri="{FF2B5EF4-FFF2-40B4-BE49-F238E27FC236}">
-                <a16:creationId xmlns:a16="http://schemas.microsoft.com/office/drawing/2014/main" id="{5A85783A-8923-4157-A106-B7FB6CD728BC}"/>
+                <a16:creationId xmlns:a16="http://schemas.microsoft.com/office/drawing/2014/main" id="{F43483CC-BC53-4876-82DE-D281B468FAF1}"/>
               </a:ext>
             </a:extLst>
           </p:cNvPr>
@@ -3386,7 +3390,7 @@
           <a:p>
             <a:r>
               <a:rPr/>
-              <a:t>File created on: 2/16/19 1:06:59 AM PST</a:t>
+              <a:t>File created on: 2/16/19 3:05:26 PM PST</a:t>
             </a:r>
           </a:p>
         </p:txBody>
@@ -3426,7 +3430,7 @@
           <p:cNvPr id="10" name="slide10">
             <a:extLst>
               <a:ext uri="{FF2B5EF4-FFF2-40B4-BE49-F238E27FC236}">
-                <a16:creationId xmlns:a16="http://schemas.microsoft.com/office/drawing/2014/main" id="{A473A830-42E7-4188-B3FD-C195DD76B4DC}"/>
+                <a16:creationId xmlns:a16="http://schemas.microsoft.com/office/drawing/2014/main" id="{82D95934-1F6F-4272-93F2-52E4571F7371}"/>
               </a:ext>
             </a:extLst>
           </p:cNvPr>
@@ -3492,7 +3496,7 @@
           <p:cNvPr id="11" name="slide11">
             <a:extLst>
               <a:ext uri="{FF2B5EF4-FFF2-40B4-BE49-F238E27FC236}">
-                <a16:creationId xmlns:a16="http://schemas.microsoft.com/office/drawing/2014/main" id="{D048263A-D6BC-4F45-A962-F46D0153A90D}"/>
+                <a16:creationId xmlns:a16="http://schemas.microsoft.com/office/drawing/2014/main" id="{64A71012-4206-43C9-A421-DC3C71BBE3ED}"/>
               </a:ext>
             </a:extLst>
           </p:cNvPr>
@@ -3558,7 +3562,7 @@
           <p:cNvPr id="12" name="slide12">
             <a:extLst>
               <a:ext uri="{FF2B5EF4-FFF2-40B4-BE49-F238E27FC236}">
-                <a16:creationId xmlns:a16="http://schemas.microsoft.com/office/drawing/2014/main" id="{19578B08-CF1A-477B-A3E2-299B3B233BAF}"/>
+                <a16:creationId xmlns:a16="http://schemas.microsoft.com/office/drawing/2014/main" id="{2FA5FAD0-F691-4922-B258-0E3DBFBC7736}"/>
               </a:ext>
             </a:extLst>
           </p:cNvPr>
@@ -3624,7 +3628,7 @@
           <p:cNvPr id="13" name="slide13">
             <a:extLst>
               <a:ext uri="{FF2B5EF4-FFF2-40B4-BE49-F238E27FC236}">
-                <a16:creationId xmlns:a16="http://schemas.microsoft.com/office/drawing/2014/main" id="{FA651095-5DCD-4797-9781-A4ADEB7F781A}"/>
+                <a16:creationId xmlns:a16="http://schemas.microsoft.com/office/drawing/2014/main" id="{1CF6A7E5-A0C4-41E6-843E-526165F96A95}"/>
               </a:ext>
             </a:extLst>
           </p:cNvPr>
@@ -3690,7 +3694,7 @@
           <p:cNvPr id="14" name="slide14">
             <a:extLst>
               <a:ext uri="{FF2B5EF4-FFF2-40B4-BE49-F238E27FC236}">
-                <a16:creationId xmlns:a16="http://schemas.microsoft.com/office/drawing/2014/main" id="{012F6EFA-78A0-4C25-9E21-554C5E3A32C7}"/>
+                <a16:creationId xmlns:a16="http://schemas.microsoft.com/office/drawing/2014/main" id="{BA5212CC-85BE-48EE-A020-92463776F5C8}"/>
               </a:ext>
             </a:extLst>
           </p:cNvPr>
@@ -3756,7 +3760,7 @@
           <p:cNvPr id="15" name="slide15">
             <a:extLst>
               <a:ext uri="{FF2B5EF4-FFF2-40B4-BE49-F238E27FC236}">
-                <a16:creationId xmlns:a16="http://schemas.microsoft.com/office/drawing/2014/main" id="{28906E31-270B-437F-8984-0D27A5E5DA19}"/>
+                <a16:creationId xmlns:a16="http://schemas.microsoft.com/office/drawing/2014/main" id="{B21685E5-C7BE-48FE-B2B2-FBC21B69111A}"/>
               </a:ext>
             </a:extLst>
           </p:cNvPr>
@@ -3781,6 +3785,270 @@
           <a:xfrm>
             <a:off x="1162050" y="238125"/>
             <a:ext cx="9867900" cy="6381750"/>
+          </a:xfrm>
+          <a:prstGeom prst="rect">
+            <a:avLst/>
+          </a:prstGeom>
+        </p:spPr>
+      </p:pic>
+    </p:spTree>
+    <p:extLst>
+      <p:ext uri="{BB962C8B-B14F-4D97-AF65-F5344CB8AC3E}">
+        <p14:creationId xmlns:p14="http://schemas.microsoft.com/office/powerpoint/2010/main" val="95992585"/>
+      </p:ext>
+    </p:extLst>
+  </p:cSld>
+  <p:clrMapOvr>
+    <a:masterClrMapping/>
+  </p:clrMapOvr>
+</p:sld>
+</file>
+
+<file path=ppt/slides/slide16.xml><?xml version="1.0" encoding="utf-8"?>
+<p:sld xmlns:a="http://schemas.openxmlformats.org/drawingml/2006/main" xmlns:p="http://schemas.openxmlformats.org/presentationml/2006/main" xmlns:r="http://schemas.openxmlformats.org/officeDocument/2006/relationships">
+  <p:cSld>
+    <p:spTree>
+      <p:nvGrpSpPr>
+        <p:cNvPr id="1" name=""/>
+        <p:cNvGrpSpPr/>
+        <p:nvPr/>
+      </p:nvGrpSpPr>
+      <p:grpSpPr>
+        <a:xfrm>
+          <a:off x="0" y="0"/>
+          <a:ext cx="0" cy="0"/>
+          <a:chOff x="0" y="0"/>
+          <a:chExt cx="0" cy="0"/>
+        </a:xfrm>
+      </p:grpSpPr>
+      <p:pic>
+        <p:nvPicPr>
+          <p:cNvPr id="16" name="slide16">
+            <a:extLst>
+              <a:ext uri="{FF2B5EF4-FFF2-40B4-BE49-F238E27FC236}">
+                <a16:creationId xmlns:a16="http://schemas.microsoft.com/office/drawing/2014/main" id="{F156FCD7-A9DD-4C0A-9056-13BFD7934700}"/>
+              </a:ext>
+            </a:extLst>
+          </p:cNvPr>
+          <p:cNvPicPr>
+            <a:picLocks noChangeAspect="1"/>
+          </p:cNvPicPr>
+          <p:nvPr/>
+        </p:nvPicPr>
+        <p:blipFill>
+          <a:blip r:embed="rId21">
+            <a:extLst>
+              <a:ext uri="{28A0092B-C50C-407E-A947-70E740481C1C}">
+                <a14:useLocalDpi xmlns:a14="http://schemas.microsoft.com/office/drawing/2010/main" val="0"/>
+              </a:ext>
+            </a:extLst>
+          </a:blip>
+          <a:stretch>
+            <a:fillRect/>
+          </a:stretch>
+        </p:blipFill>
+        <p:spPr>
+          <a:xfrm>
+            <a:off x="1157287" y="157162"/>
+            <a:ext cx="9877425" cy="6543675"/>
+          </a:xfrm>
+          <a:prstGeom prst="rect">
+            <a:avLst/>
+          </a:prstGeom>
+        </p:spPr>
+      </p:pic>
+    </p:spTree>
+    <p:extLst>
+      <p:ext uri="{BB962C8B-B14F-4D97-AF65-F5344CB8AC3E}">
+        <p14:creationId xmlns:p14="http://schemas.microsoft.com/office/powerpoint/2010/main" val="95992585"/>
+      </p:ext>
+    </p:extLst>
+  </p:cSld>
+  <p:clrMapOvr>
+    <a:masterClrMapping/>
+  </p:clrMapOvr>
+</p:sld>
+</file>
+
+<file path=ppt/slides/slide17.xml><?xml version="1.0" encoding="utf-8"?>
+<p:sld xmlns:a="http://schemas.openxmlformats.org/drawingml/2006/main" xmlns:p="http://schemas.openxmlformats.org/presentationml/2006/main" xmlns:r="http://schemas.openxmlformats.org/officeDocument/2006/relationships">
+  <p:cSld>
+    <p:spTree>
+      <p:nvGrpSpPr>
+        <p:cNvPr id="1" name=""/>
+        <p:cNvGrpSpPr/>
+        <p:nvPr/>
+      </p:nvGrpSpPr>
+      <p:grpSpPr>
+        <a:xfrm>
+          <a:off x="0" y="0"/>
+          <a:ext cx="0" cy="0"/>
+          <a:chOff x="0" y="0"/>
+          <a:chExt cx="0" cy="0"/>
+        </a:xfrm>
+      </p:grpSpPr>
+      <p:pic>
+        <p:nvPicPr>
+          <p:cNvPr id="17" name="slide17">
+            <a:extLst>
+              <a:ext uri="{FF2B5EF4-FFF2-40B4-BE49-F238E27FC236}">
+                <a16:creationId xmlns:a16="http://schemas.microsoft.com/office/drawing/2014/main" id="{E12FA4FF-BBB2-4836-8544-49C62508A46D}"/>
+              </a:ext>
+            </a:extLst>
+          </p:cNvPr>
+          <p:cNvPicPr>
+            <a:picLocks noChangeAspect="1"/>
+          </p:cNvPicPr>
+          <p:nvPr/>
+        </p:nvPicPr>
+        <p:blipFill>
+          <a:blip r:embed="rId22">
+            <a:extLst>
+              <a:ext uri="{28A0092B-C50C-407E-A947-70E740481C1C}">
+                <a14:useLocalDpi xmlns:a14="http://schemas.microsoft.com/office/drawing/2010/main" val="0"/>
+              </a:ext>
+            </a:extLst>
+          </a:blip>
+          <a:stretch>
+            <a:fillRect/>
+          </a:stretch>
+        </p:blipFill>
+        <p:spPr>
+          <a:xfrm>
+            <a:off x="1157287" y="157162"/>
+            <a:ext cx="9877425" cy="6543675"/>
+          </a:xfrm>
+          <a:prstGeom prst="rect">
+            <a:avLst/>
+          </a:prstGeom>
+        </p:spPr>
+      </p:pic>
+    </p:spTree>
+    <p:extLst>
+      <p:ext uri="{BB962C8B-B14F-4D97-AF65-F5344CB8AC3E}">
+        <p14:creationId xmlns:p14="http://schemas.microsoft.com/office/powerpoint/2010/main" val="95992585"/>
+      </p:ext>
+    </p:extLst>
+  </p:cSld>
+  <p:clrMapOvr>
+    <a:masterClrMapping/>
+  </p:clrMapOvr>
+</p:sld>
+</file>
+
+<file path=ppt/slides/slide18.xml><?xml version="1.0" encoding="utf-8"?>
+<p:sld xmlns:a="http://schemas.openxmlformats.org/drawingml/2006/main" xmlns:p="http://schemas.openxmlformats.org/presentationml/2006/main" xmlns:r="http://schemas.openxmlformats.org/officeDocument/2006/relationships">
+  <p:cSld>
+    <p:spTree>
+      <p:nvGrpSpPr>
+        <p:cNvPr id="1" name=""/>
+        <p:cNvGrpSpPr/>
+        <p:nvPr/>
+      </p:nvGrpSpPr>
+      <p:grpSpPr>
+        <a:xfrm>
+          <a:off x="0" y="0"/>
+          <a:ext cx="0" cy="0"/>
+          <a:chOff x="0" y="0"/>
+          <a:chExt cx="0" cy="0"/>
+        </a:xfrm>
+      </p:grpSpPr>
+      <p:pic>
+        <p:nvPicPr>
+          <p:cNvPr id="18" name="slide18">
+            <a:extLst>
+              <a:ext uri="{FF2B5EF4-FFF2-40B4-BE49-F238E27FC236}">
+                <a16:creationId xmlns:a16="http://schemas.microsoft.com/office/drawing/2014/main" id="{F51E0646-D625-429C-B58A-85F41EA6F6C3}"/>
+              </a:ext>
+            </a:extLst>
+          </p:cNvPr>
+          <p:cNvPicPr>
+            <a:picLocks noChangeAspect="1"/>
+          </p:cNvPicPr>
+          <p:nvPr/>
+        </p:nvPicPr>
+        <p:blipFill>
+          <a:blip r:embed="rId23">
+            <a:extLst>
+              <a:ext uri="{28A0092B-C50C-407E-A947-70E740481C1C}">
+                <a14:useLocalDpi xmlns:a14="http://schemas.microsoft.com/office/drawing/2010/main" val="0"/>
+              </a:ext>
+            </a:extLst>
+          </a:blip>
+          <a:stretch>
+            <a:fillRect/>
+          </a:stretch>
+        </p:blipFill>
+        <p:spPr>
+          <a:xfrm>
+            <a:off x="1162050" y="1614487"/>
+            <a:ext cx="9867900" cy="3629025"/>
+          </a:xfrm>
+          <a:prstGeom prst="rect">
+            <a:avLst/>
+          </a:prstGeom>
+        </p:spPr>
+      </p:pic>
+    </p:spTree>
+    <p:extLst>
+      <p:ext uri="{BB962C8B-B14F-4D97-AF65-F5344CB8AC3E}">
+        <p14:creationId xmlns:p14="http://schemas.microsoft.com/office/powerpoint/2010/main" val="95992585"/>
+      </p:ext>
+    </p:extLst>
+  </p:cSld>
+  <p:clrMapOvr>
+    <a:masterClrMapping/>
+  </p:clrMapOvr>
+</p:sld>
+</file>
+
+<file path=ppt/slides/slide19.xml><?xml version="1.0" encoding="utf-8"?>
+<p:sld xmlns:a="http://schemas.openxmlformats.org/drawingml/2006/main" xmlns:p="http://schemas.openxmlformats.org/presentationml/2006/main" xmlns:r="http://schemas.openxmlformats.org/officeDocument/2006/relationships">
+  <p:cSld>
+    <p:spTree>
+      <p:nvGrpSpPr>
+        <p:cNvPr id="1" name=""/>
+        <p:cNvGrpSpPr/>
+        <p:nvPr/>
+      </p:nvGrpSpPr>
+      <p:grpSpPr>
+        <a:xfrm>
+          <a:off x="0" y="0"/>
+          <a:ext cx="0" cy="0"/>
+          <a:chOff x="0" y="0"/>
+          <a:chExt cx="0" cy="0"/>
+        </a:xfrm>
+      </p:grpSpPr>
+      <p:pic>
+        <p:nvPicPr>
+          <p:cNvPr id="19" name="slide19">
+            <a:extLst>
+              <a:ext uri="{FF2B5EF4-FFF2-40B4-BE49-F238E27FC236}">
+                <a16:creationId xmlns:a16="http://schemas.microsoft.com/office/drawing/2014/main" id="{8A93427C-8E56-432F-BFE2-88DEFD5B5FB6}"/>
+              </a:ext>
+            </a:extLst>
+          </p:cNvPr>
+          <p:cNvPicPr>
+            <a:picLocks noChangeAspect="1"/>
+          </p:cNvPicPr>
+          <p:nvPr/>
+        </p:nvPicPr>
+        <p:blipFill>
+          <a:blip r:embed="rId24">
+            <a:extLst>
+              <a:ext uri="{28A0092B-C50C-407E-A947-70E740481C1C}">
+                <a14:useLocalDpi xmlns:a14="http://schemas.microsoft.com/office/drawing/2010/main" val="0"/>
+              </a:ext>
+            </a:extLst>
+          </a:blip>
+          <a:stretch>
+            <a:fillRect/>
+          </a:stretch>
+        </p:blipFill>
+        <p:spPr>
+          <a:xfrm>
+            <a:off x="1162050" y="1614487"/>
+            <a:ext cx="9867900" cy="3629025"/>
           </a:xfrm>
           <a:prstGeom prst="rect">
             <a:avLst/>
@@ -3822,7 +4090,7 @@
           <p:cNvPr id="2" name="slide2">
             <a:extLst>
               <a:ext uri="{FF2B5EF4-FFF2-40B4-BE49-F238E27FC236}">
-                <a16:creationId xmlns:a16="http://schemas.microsoft.com/office/drawing/2014/main" id="{7D834B91-DB5B-462F-865E-C2B35BFCA743}"/>
+                <a16:creationId xmlns:a16="http://schemas.microsoft.com/office/drawing/2014/main" id="{CBCDF631-AA27-416F-B2BF-4A0835E8085F}"/>
               </a:ext>
             </a:extLst>
           </p:cNvPr>
@@ -3888,7 +4156,7 @@
           <p:cNvPr id="3" name="slide3">
             <a:extLst>
               <a:ext uri="{FF2B5EF4-FFF2-40B4-BE49-F238E27FC236}">
-                <a16:creationId xmlns:a16="http://schemas.microsoft.com/office/drawing/2014/main" id="{0AB75701-5A26-4EBA-844B-0934D2BBFF0B}"/>
+                <a16:creationId xmlns:a16="http://schemas.microsoft.com/office/drawing/2014/main" id="{67871FE3-60E1-42CB-8A0D-4A968B6D3A0A}"/>
               </a:ext>
             </a:extLst>
           </p:cNvPr>
@@ -3954,7 +4222,7 @@
           <p:cNvPr id="4" name="slide4">
             <a:extLst>
               <a:ext uri="{FF2B5EF4-FFF2-40B4-BE49-F238E27FC236}">
-                <a16:creationId xmlns:a16="http://schemas.microsoft.com/office/drawing/2014/main" id="{EAB8C28F-6567-4A23-83EC-F9EAB2348572}"/>
+                <a16:creationId xmlns:a16="http://schemas.microsoft.com/office/drawing/2014/main" id="{8CE82750-604B-4AE8-8E0D-3B47B66F5B8B}"/>
               </a:ext>
             </a:extLst>
           </p:cNvPr>
@@ -4020,7 +4288,7 @@
           <p:cNvPr id="5" name="slide5">
             <a:extLst>
               <a:ext uri="{FF2B5EF4-FFF2-40B4-BE49-F238E27FC236}">
-                <a16:creationId xmlns:a16="http://schemas.microsoft.com/office/drawing/2014/main" id="{B064FAC4-6F2C-4DBE-A9E9-4F1BFC17F3EE}"/>
+                <a16:creationId xmlns:a16="http://schemas.microsoft.com/office/drawing/2014/main" id="{A816DB9B-BF66-408D-9565-9153702C28F4}"/>
               </a:ext>
             </a:extLst>
           </p:cNvPr>
@@ -4086,7 +4354,7 @@
           <p:cNvPr id="6" name="slide6">
             <a:extLst>
               <a:ext uri="{FF2B5EF4-FFF2-40B4-BE49-F238E27FC236}">
-                <a16:creationId xmlns:a16="http://schemas.microsoft.com/office/drawing/2014/main" id="{01ECA044-6FE0-4B2F-8A2D-C466A93FABF1}"/>
+                <a16:creationId xmlns:a16="http://schemas.microsoft.com/office/drawing/2014/main" id="{D1A6B1B6-D029-4133-A857-9084025D23B5}"/>
               </a:ext>
             </a:extLst>
           </p:cNvPr>
@@ -4152,7 +4420,7 @@
           <p:cNvPr id="7" name="slide7">
             <a:extLst>
               <a:ext uri="{FF2B5EF4-FFF2-40B4-BE49-F238E27FC236}">
-                <a16:creationId xmlns:a16="http://schemas.microsoft.com/office/drawing/2014/main" id="{5E1061B2-F3A2-4FA2-AA71-59019A55C7FE}"/>
+                <a16:creationId xmlns:a16="http://schemas.microsoft.com/office/drawing/2014/main" id="{12A974A3-8C67-4905-990B-6E8076212CA9}"/>
               </a:ext>
             </a:extLst>
           </p:cNvPr>
@@ -4218,7 +4486,7 @@
           <p:cNvPr id="8" name="slide8">
             <a:extLst>
               <a:ext uri="{FF2B5EF4-FFF2-40B4-BE49-F238E27FC236}">
-                <a16:creationId xmlns:a16="http://schemas.microsoft.com/office/drawing/2014/main" id="{C2E73E82-4428-4941-90C0-38D03020C65D}"/>
+                <a16:creationId xmlns:a16="http://schemas.microsoft.com/office/drawing/2014/main" id="{9F8F4C1F-9954-49FB-B031-25BCCC6A106C}"/>
               </a:ext>
             </a:extLst>
           </p:cNvPr>
@@ -4284,7 +4552,7 @@
           <p:cNvPr id="9" name="slide9">
             <a:extLst>
               <a:ext uri="{FF2B5EF4-FFF2-40B4-BE49-F238E27FC236}">
-                <a16:creationId xmlns:a16="http://schemas.microsoft.com/office/drawing/2014/main" id="{52EA39F6-D874-4509-8A61-BF6611A94149}"/>
+                <a16:creationId xmlns:a16="http://schemas.microsoft.com/office/drawing/2014/main" id="{03B40167-5E5F-406D-AD8D-431CED6E02BD}"/>
               </a:ext>
             </a:extLst>
           </p:cNvPr>

</xml_diff>